<commit_message>
Added Activity Scen. + Usability Req. + Func. and Tasks
</commit_message>
<xml_diff>
--- a/IPC.pptx
+++ b/IPC.pptx
@@ -5,7 +5,7 @@
     <p:sldMasterId id="2147483648" r:id="rId4"/>
   </p:sldMasterIdLst>
   <p:notesMasterIdLst>
-    <p:notesMasterId r:id="rId11"/>
+    <p:notesMasterId r:id="rId14"/>
   </p:notesMasterIdLst>
   <p:sldIdLst>
     <p:sldId id="256" r:id="rId5"/>
@@ -13,7 +13,10 @@
     <p:sldId id="288" r:id="rId7"/>
     <p:sldId id="290" r:id="rId8"/>
     <p:sldId id="292" r:id="rId9"/>
-    <p:sldId id="291" r:id="rId10"/>
+    <p:sldId id="293" r:id="rId10"/>
+    <p:sldId id="295" r:id="rId11"/>
+    <p:sldId id="294" r:id="rId12"/>
+    <p:sldId id="291" r:id="rId13"/>
   </p:sldIdLst>
   <p:sldSz cx="12192000" cy="6858000"/>
   <p:notesSz cx="6858000" cy="9144000"/>
@@ -545,6 +548,258 @@
     <p:extLst>
       <p:ext uri="{BB962C8B-B14F-4D97-AF65-F5344CB8AC3E}">
         <p14:creationId xmlns:p14="http://schemas.microsoft.com/office/powerpoint/2010/main" val="3582824318"/>
+      </p:ext>
+    </p:extLst>
+  </p:cSld>
+  <p:clrMapOvr>
+    <a:masterClrMapping/>
+  </p:clrMapOvr>
+</p:notes>
+</file>
+
+<file path=ppt/notesSlides/notesSlide2.xml><?xml version="1.0" encoding="utf-8"?>
+<p:notes xmlns:a="http://schemas.openxmlformats.org/drawingml/2006/main" xmlns:r="http://schemas.openxmlformats.org/officeDocument/2006/relationships" xmlns:p="http://schemas.openxmlformats.org/presentationml/2006/main">
+  <p:cSld>
+    <p:spTree>
+      <p:nvGrpSpPr>
+        <p:cNvPr id="1" name=""/>
+        <p:cNvGrpSpPr/>
+        <p:nvPr/>
+      </p:nvGrpSpPr>
+      <p:grpSpPr>
+        <a:xfrm>
+          <a:off x="0" y="0"/>
+          <a:ext cx="0" cy="0"/>
+          <a:chOff x="0" y="0"/>
+          <a:chExt cx="0" cy="0"/>
+        </a:xfrm>
+      </p:grpSpPr>
+      <p:sp>
+        <p:nvSpPr>
+          <p:cNvPr id="2" name="Slide Image Placeholder 1"/>
+          <p:cNvSpPr>
+            <a:spLocks noGrp="1" noRot="1" noChangeAspect="1"/>
+          </p:cNvSpPr>
+          <p:nvPr>
+            <p:ph type="sldImg"/>
+          </p:nvPr>
+        </p:nvSpPr>
+        <p:spPr/>
+      </p:sp>
+      <p:sp>
+        <p:nvSpPr>
+          <p:cNvPr id="3" name="Notes Placeholder 2"/>
+          <p:cNvSpPr>
+            <a:spLocks noGrp="1"/>
+          </p:cNvSpPr>
+          <p:nvPr>
+            <p:ph type="body" idx="1"/>
+          </p:nvPr>
+        </p:nvSpPr>
+        <p:spPr/>
+        <p:txBody>
+          <a:bodyPr/>
+          <a:lstStyle/>
+          <a:p>
+            <a:endParaRPr lang="en-GB" dirty="0"/>
+          </a:p>
+        </p:txBody>
+      </p:sp>
+      <p:sp>
+        <p:nvSpPr>
+          <p:cNvPr id="4" name="Slide Number Placeholder 3"/>
+          <p:cNvSpPr>
+            <a:spLocks noGrp="1"/>
+          </p:cNvSpPr>
+          <p:nvPr>
+            <p:ph type="sldNum" sz="quarter" idx="5"/>
+          </p:nvPr>
+        </p:nvSpPr>
+        <p:spPr/>
+        <p:txBody>
+          <a:bodyPr/>
+          <a:lstStyle/>
+          <a:p>
+            <a:fld id="{906F7766-1CC8-4293-8AE3-F91239FA91DA}" type="slidenum">
+              <a:rPr lang="en-GB" smtClean="0"/>
+              <a:t>6</a:t>
+            </a:fld>
+            <a:endParaRPr lang="en-GB"/>
+          </a:p>
+        </p:txBody>
+      </p:sp>
+    </p:spTree>
+    <p:extLst>
+      <p:ext uri="{BB962C8B-B14F-4D97-AF65-F5344CB8AC3E}">
+        <p14:creationId xmlns:p14="http://schemas.microsoft.com/office/powerpoint/2010/main" val="1719635746"/>
+      </p:ext>
+    </p:extLst>
+  </p:cSld>
+  <p:clrMapOvr>
+    <a:masterClrMapping/>
+  </p:clrMapOvr>
+</p:notes>
+</file>
+
+<file path=ppt/notesSlides/notesSlide3.xml><?xml version="1.0" encoding="utf-8"?>
+<p:notes xmlns:a="http://schemas.openxmlformats.org/drawingml/2006/main" xmlns:r="http://schemas.openxmlformats.org/officeDocument/2006/relationships" xmlns:p="http://schemas.openxmlformats.org/presentationml/2006/main">
+  <p:cSld>
+    <p:spTree>
+      <p:nvGrpSpPr>
+        <p:cNvPr id="1" name=""/>
+        <p:cNvGrpSpPr/>
+        <p:nvPr/>
+      </p:nvGrpSpPr>
+      <p:grpSpPr>
+        <a:xfrm>
+          <a:off x="0" y="0"/>
+          <a:ext cx="0" cy="0"/>
+          <a:chOff x="0" y="0"/>
+          <a:chExt cx="0" cy="0"/>
+        </a:xfrm>
+      </p:grpSpPr>
+      <p:sp>
+        <p:nvSpPr>
+          <p:cNvPr id="2" name="Slide Image Placeholder 1"/>
+          <p:cNvSpPr>
+            <a:spLocks noGrp="1" noRot="1" noChangeAspect="1"/>
+          </p:cNvSpPr>
+          <p:nvPr>
+            <p:ph type="sldImg"/>
+          </p:nvPr>
+        </p:nvSpPr>
+        <p:spPr/>
+      </p:sp>
+      <p:sp>
+        <p:nvSpPr>
+          <p:cNvPr id="3" name="Notes Placeholder 2"/>
+          <p:cNvSpPr>
+            <a:spLocks noGrp="1"/>
+          </p:cNvSpPr>
+          <p:nvPr>
+            <p:ph type="body" idx="1"/>
+          </p:nvPr>
+        </p:nvSpPr>
+        <p:spPr/>
+        <p:txBody>
+          <a:bodyPr/>
+          <a:lstStyle/>
+          <a:p>
+            <a:endParaRPr lang="en-GB" dirty="0"/>
+          </a:p>
+        </p:txBody>
+      </p:sp>
+      <p:sp>
+        <p:nvSpPr>
+          <p:cNvPr id="4" name="Slide Number Placeholder 3"/>
+          <p:cNvSpPr>
+            <a:spLocks noGrp="1"/>
+          </p:cNvSpPr>
+          <p:nvPr>
+            <p:ph type="sldNum" sz="quarter" idx="5"/>
+          </p:nvPr>
+        </p:nvSpPr>
+        <p:spPr/>
+        <p:txBody>
+          <a:bodyPr/>
+          <a:lstStyle/>
+          <a:p>
+            <a:fld id="{906F7766-1CC8-4293-8AE3-F91239FA91DA}" type="slidenum">
+              <a:rPr lang="en-GB" smtClean="0"/>
+              <a:t>7</a:t>
+            </a:fld>
+            <a:endParaRPr lang="en-GB"/>
+          </a:p>
+        </p:txBody>
+      </p:sp>
+    </p:spTree>
+    <p:extLst>
+      <p:ext uri="{BB962C8B-B14F-4D97-AF65-F5344CB8AC3E}">
+        <p14:creationId xmlns:p14="http://schemas.microsoft.com/office/powerpoint/2010/main" val="3106670743"/>
+      </p:ext>
+    </p:extLst>
+  </p:cSld>
+  <p:clrMapOvr>
+    <a:masterClrMapping/>
+  </p:clrMapOvr>
+</p:notes>
+</file>
+
+<file path=ppt/notesSlides/notesSlide4.xml><?xml version="1.0" encoding="utf-8"?>
+<p:notes xmlns:a="http://schemas.openxmlformats.org/drawingml/2006/main" xmlns:r="http://schemas.openxmlformats.org/officeDocument/2006/relationships" xmlns:p="http://schemas.openxmlformats.org/presentationml/2006/main">
+  <p:cSld>
+    <p:spTree>
+      <p:nvGrpSpPr>
+        <p:cNvPr id="1" name=""/>
+        <p:cNvGrpSpPr/>
+        <p:nvPr/>
+      </p:nvGrpSpPr>
+      <p:grpSpPr>
+        <a:xfrm>
+          <a:off x="0" y="0"/>
+          <a:ext cx="0" cy="0"/>
+          <a:chOff x="0" y="0"/>
+          <a:chExt cx="0" cy="0"/>
+        </a:xfrm>
+      </p:grpSpPr>
+      <p:sp>
+        <p:nvSpPr>
+          <p:cNvPr id="2" name="Slide Image Placeholder 1"/>
+          <p:cNvSpPr>
+            <a:spLocks noGrp="1" noRot="1" noChangeAspect="1"/>
+          </p:cNvSpPr>
+          <p:nvPr>
+            <p:ph type="sldImg"/>
+          </p:nvPr>
+        </p:nvSpPr>
+        <p:spPr/>
+      </p:sp>
+      <p:sp>
+        <p:nvSpPr>
+          <p:cNvPr id="3" name="Notes Placeholder 2"/>
+          <p:cNvSpPr>
+            <a:spLocks noGrp="1"/>
+          </p:cNvSpPr>
+          <p:nvPr>
+            <p:ph type="body" idx="1"/>
+          </p:nvPr>
+        </p:nvSpPr>
+        <p:spPr/>
+        <p:txBody>
+          <a:bodyPr/>
+          <a:lstStyle/>
+          <a:p>
+            <a:endParaRPr lang="en-GB" dirty="0"/>
+          </a:p>
+        </p:txBody>
+      </p:sp>
+      <p:sp>
+        <p:nvSpPr>
+          <p:cNvPr id="4" name="Slide Number Placeholder 3"/>
+          <p:cNvSpPr>
+            <a:spLocks noGrp="1"/>
+          </p:cNvSpPr>
+          <p:nvPr>
+            <p:ph type="sldNum" sz="quarter" idx="5"/>
+          </p:nvPr>
+        </p:nvSpPr>
+        <p:spPr/>
+        <p:txBody>
+          <a:bodyPr/>
+          <a:lstStyle/>
+          <a:p>
+            <a:fld id="{906F7766-1CC8-4293-8AE3-F91239FA91DA}" type="slidenum">
+              <a:rPr lang="en-GB" smtClean="0"/>
+              <a:t>8</a:t>
+            </a:fld>
+            <a:endParaRPr lang="en-GB"/>
+          </a:p>
+        </p:txBody>
+      </p:sp>
+    </p:spTree>
+    <p:extLst>
+      <p:ext uri="{BB962C8B-B14F-4D97-AF65-F5344CB8AC3E}">
+        <p14:creationId xmlns:p14="http://schemas.microsoft.com/office/powerpoint/2010/main" val="3675151245"/>
       </p:ext>
     </p:extLst>
   </p:cSld>
@@ -9703,6 +9958,1414 @@
 </file>
 
 <file path=ppt/slides/slide6.xml><?xml version="1.0" encoding="utf-8"?>
+<p:sld xmlns:a="http://schemas.openxmlformats.org/drawingml/2006/main" xmlns:r="http://schemas.openxmlformats.org/officeDocument/2006/relationships" xmlns:p="http://schemas.openxmlformats.org/presentationml/2006/main">
+  <p:cSld>
+    <p:spTree>
+      <p:nvGrpSpPr>
+        <p:cNvPr id="1" name=""/>
+        <p:cNvGrpSpPr/>
+        <p:nvPr/>
+      </p:nvGrpSpPr>
+      <p:grpSpPr>
+        <a:xfrm>
+          <a:off x="0" y="0"/>
+          <a:ext cx="0" cy="0"/>
+          <a:chOff x="0" y="0"/>
+          <a:chExt cx="0" cy="0"/>
+        </a:xfrm>
+      </p:grpSpPr>
+      <p:pic>
+        <p:nvPicPr>
+          <p:cNvPr id="5" name="Picture 4" descr="A picture containing text, clipart&#10;&#10;Description automatically generated">
+            <a:extLst>
+              <a:ext uri="{FF2B5EF4-FFF2-40B4-BE49-F238E27FC236}">
+                <a16:creationId xmlns:a16="http://schemas.microsoft.com/office/drawing/2014/main" id="{AEEF4F80-6182-437F-8FB9-E546318E1786}"/>
+              </a:ext>
+            </a:extLst>
+          </p:cNvPr>
+          <p:cNvPicPr>
+            <a:picLocks noChangeAspect="1"/>
+          </p:cNvPicPr>
+          <p:nvPr/>
+        </p:nvPicPr>
+        <p:blipFill>
+          <a:blip r:embed="rId3">
+            <a:extLst>
+              <a:ext uri="{28A0092B-C50C-407E-A947-70E740481C1C}">
+                <a14:useLocalDpi xmlns:a14="http://schemas.microsoft.com/office/drawing/2010/main" val="0"/>
+              </a:ext>
+            </a:extLst>
+          </a:blip>
+          <a:stretch>
+            <a:fillRect/>
+          </a:stretch>
+        </p:blipFill>
+        <p:spPr>
+          <a:xfrm>
+            <a:off x="8248817" y="327168"/>
+            <a:ext cx="3640043" cy="1401476"/>
+          </a:xfrm>
+          <a:prstGeom prst="rect">
+            <a:avLst/>
+          </a:prstGeom>
+        </p:spPr>
+      </p:pic>
+      <p:sp>
+        <p:nvSpPr>
+          <p:cNvPr id="6" name="Title 1">
+            <a:extLst>
+              <a:ext uri="{FF2B5EF4-FFF2-40B4-BE49-F238E27FC236}">
+                <a16:creationId xmlns:a16="http://schemas.microsoft.com/office/drawing/2014/main" id="{67EAB101-CB65-4E80-9086-38AF17265C5D}"/>
+              </a:ext>
+            </a:extLst>
+          </p:cNvPr>
+          <p:cNvSpPr txBox="1">
+            <a:spLocks/>
+          </p:cNvSpPr>
+          <p:nvPr/>
+        </p:nvSpPr>
+        <p:spPr>
+          <a:xfrm>
+            <a:off x="704851" y="549440"/>
+            <a:ext cx="7219949" cy="914399"/>
+          </a:xfrm>
+          <a:prstGeom prst="rect">
+            <a:avLst/>
+          </a:prstGeom>
+        </p:spPr>
+        <p:txBody>
+          <a:bodyPr vert="horz" lIns="91440" tIns="45720" rIns="91440" bIns="45720" rtlCol="0" anchor="ctr">
+            <a:normAutofit/>
+          </a:bodyPr>
+          <a:lstStyle>
+            <a:lvl1pPr algn="l" defTabSz="914400" rtl="0" eaLnBrk="1" latinLnBrk="0" hangingPunct="1">
+              <a:lnSpc>
+                <a:spcPct val="90000"/>
+              </a:lnSpc>
+              <a:spcBef>
+                <a:spcPct val="0"/>
+              </a:spcBef>
+              <a:buNone/>
+              <a:defRPr sz="4400" kern="1200">
+                <a:solidFill>
+                  <a:schemeClr val="tx1"/>
+                </a:solidFill>
+                <a:latin typeface="+mj-lt"/>
+                <a:ea typeface="+mj-ea"/>
+                <a:cs typeface="+mj-cs"/>
+              </a:defRPr>
+            </a:lvl1pPr>
+          </a:lstStyle>
+          <a:p>
+            <a:r>
+              <a:rPr lang="en-US" b="1" dirty="0"/>
+              <a:t>Activity Scenario of Carlos Silva</a:t>
+            </a:r>
+          </a:p>
+        </p:txBody>
+      </p:sp>
+      <p:sp>
+        <p:nvSpPr>
+          <p:cNvPr id="11" name="Content Placeholder 2">
+            <a:extLst>
+              <a:ext uri="{FF2B5EF4-FFF2-40B4-BE49-F238E27FC236}">
+                <a16:creationId xmlns:a16="http://schemas.microsoft.com/office/drawing/2014/main" id="{6AB2115D-5135-CEAE-2998-AD5A7339ADDB}"/>
+              </a:ext>
+            </a:extLst>
+          </p:cNvPr>
+          <p:cNvSpPr txBox="1">
+            <a:spLocks/>
+          </p:cNvSpPr>
+          <p:nvPr/>
+        </p:nvSpPr>
+        <p:spPr>
+          <a:xfrm>
+            <a:off x="761170" y="2264230"/>
+            <a:ext cx="10669660" cy="4266602"/>
+          </a:xfrm>
+          <a:prstGeom prst="rect">
+            <a:avLst/>
+          </a:prstGeom>
+        </p:spPr>
+        <p:txBody>
+          <a:bodyPr vert="horz" lIns="91440" tIns="45720" rIns="91440" bIns="45720" rtlCol="0">
+            <a:normAutofit/>
+          </a:bodyPr>
+          <a:lstStyle>
+            <a:lvl1pPr marL="228600" indent="-228600" algn="l" defTabSz="914400" rtl="0" eaLnBrk="1" latinLnBrk="0" hangingPunct="1">
+              <a:lnSpc>
+                <a:spcPct val="90000"/>
+              </a:lnSpc>
+              <a:spcBef>
+                <a:spcPts val="1000"/>
+              </a:spcBef>
+              <a:buFont typeface="Arial" panose="020B0604020202020204" pitchFamily="34" charset="0"/>
+              <a:buChar char="•"/>
+              <a:defRPr sz="2800" kern="1200">
+                <a:solidFill>
+                  <a:schemeClr val="tx1"/>
+                </a:solidFill>
+                <a:latin typeface="+mn-lt"/>
+                <a:ea typeface="+mn-ea"/>
+                <a:cs typeface="+mn-cs"/>
+              </a:defRPr>
+            </a:lvl1pPr>
+            <a:lvl2pPr marL="685800" indent="-228600" algn="l" defTabSz="914400" rtl="0" eaLnBrk="1" latinLnBrk="0" hangingPunct="1">
+              <a:lnSpc>
+                <a:spcPct val="90000"/>
+              </a:lnSpc>
+              <a:spcBef>
+                <a:spcPts val="500"/>
+              </a:spcBef>
+              <a:buFont typeface="Arial" panose="020B0604020202020204" pitchFamily="34" charset="0"/>
+              <a:buChar char="•"/>
+              <a:defRPr sz="2400" kern="1200">
+                <a:solidFill>
+                  <a:schemeClr val="tx1"/>
+                </a:solidFill>
+                <a:latin typeface="+mn-lt"/>
+                <a:ea typeface="+mn-ea"/>
+                <a:cs typeface="+mn-cs"/>
+              </a:defRPr>
+            </a:lvl2pPr>
+            <a:lvl3pPr marL="1143000" indent="-228600" algn="l" defTabSz="914400" rtl="0" eaLnBrk="1" latinLnBrk="0" hangingPunct="1">
+              <a:lnSpc>
+                <a:spcPct val="90000"/>
+              </a:lnSpc>
+              <a:spcBef>
+                <a:spcPts val="500"/>
+              </a:spcBef>
+              <a:buFont typeface="Arial" panose="020B0604020202020204" pitchFamily="34" charset="0"/>
+              <a:buChar char="•"/>
+              <a:defRPr sz="2000" kern="1200">
+                <a:solidFill>
+                  <a:schemeClr val="tx1"/>
+                </a:solidFill>
+                <a:latin typeface="+mn-lt"/>
+                <a:ea typeface="+mn-ea"/>
+                <a:cs typeface="+mn-cs"/>
+              </a:defRPr>
+            </a:lvl3pPr>
+            <a:lvl4pPr marL="1600200" indent="-228600" algn="l" defTabSz="914400" rtl="0" eaLnBrk="1" latinLnBrk="0" hangingPunct="1">
+              <a:lnSpc>
+                <a:spcPct val="90000"/>
+              </a:lnSpc>
+              <a:spcBef>
+                <a:spcPts val="500"/>
+              </a:spcBef>
+              <a:buFont typeface="Arial" panose="020B0604020202020204" pitchFamily="34" charset="0"/>
+              <a:buChar char="•"/>
+              <a:defRPr sz="1800" kern="1200">
+                <a:solidFill>
+                  <a:schemeClr val="tx1"/>
+                </a:solidFill>
+                <a:latin typeface="+mn-lt"/>
+                <a:ea typeface="+mn-ea"/>
+                <a:cs typeface="+mn-cs"/>
+              </a:defRPr>
+            </a:lvl4pPr>
+            <a:lvl5pPr marL="2057400" indent="-228600" algn="l" defTabSz="914400" rtl="0" eaLnBrk="1" latinLnBrk="0" hangingPunct="1">
+              <a:lnSpc>
+                <a:spcPct val="90000"/>
+              </a:lnSpc>
+              <a:spcBef>
+                <a:spcPts val="500"/>
+              </a:spcBef>
+              <a:buFont typeface="Arial" panose="020B0604020202020204" pitchFamily="34" charset="0"/>
+              <a:buChar char="•"/>
+              <a:defRPr sz="1800" kern="1200">
+                <a:solidFill>
+                  <a:schemeClr val="tx1"/>
+                </a:solidFill>
+                <a:latin typeface="+mn-lt"/>
+                <a:ea typeface="+mn-ea"/>
+                <a:cs typeface="+mn-cs"/>
+              </a:defRPr>
+            </a:lvl5pPr>
+            <a:lvl6pPr marL="2514600" indent="-228600" algn="l" defTabSz="914400" rtl="0" eaLnBrk="1" latinLnBrk="0" hangingPunct="1">
+              <a:lnSpc>
+                <a:spcPct val="90000"/>
+              </a:lnSpc>
+              <a:spcBef>
+                <a:spcPts val="500"/>
+              </a:spcBef>
+              <a:buFont typeface="Arial" panose="020B0604020202020204" pitchFamily="34" charset="0"/>
+              <a:buChar char="•"/>
+              <a:defRPr sz="1800" kern="1200">
+                <a:solidFill>
+                  <a:schemeClr val="tx1"/>
+                </a:solidFill>
+                <a:latin typeface="+mn-lt"/>
+                <a:ea typeface="+mn-ea"/>
+                <a:cs typeface="+mn-cs"/>
+              </a:defRPr>
+            </a:lvl6pPr>
+            <a:lvl7pPr marL="2971800" indent="-228600" algn="l" defTabSz="914400" rtl="0" eaLnBrk="1" latinLnBrk="0" hangingPunct="1">
+              <a:lnSpc>
+                <a:spcPct val="90000"/>
+              </a:lnSpc>
+              <a:spcBef>
+                <a:spcPts val="500"/>
+              </a:spcBef>
+              <a:buFont typeface="Arial" panose="020B0604020202020204" pitchFamily="34" charset="0"/>
+              <a:buChar char="•"/>
+              <a:defRPr sz="1800" kern="1200">
+                <a:solidFill>
+                  <a:schemeClr val="tx1"/>
+                </a:solidFill>
+                <a:latin typeface="+mn-lt"/>
+                <a:ea typeface="+mn-ea"/>
+                <a:cs typeface="+mn-cs"/>
+              </a:defRPr>
+            </a:lvl7pPr>
+            <a:lvl8pPr marL="3429000" indent="-228600" algn="l" defTabSz="914400" rtl="0" eaLnBrk="1" latinLnBrk="0" hangingPunct="1">
+              <a:lnSpc>
+                <a:spcPct val="90000"/>
+              </a:lnSpc>
+              <a:spcBef>
+                <a:spcPts val="500"/>
+              </a:spcBef>
+              <a:buFont typeface="Arial" panose="020B0604020202020204" pitchFamily="34" charset="0"/>
+              <a:buChar char="•"/>
+              <a:defRPr sz="1800" kern="1200">
+                <a:solidFill>
+                  <a:schemeClr val="tx1"/>
+                </a:solidFill>
+                <a:latin typeface="+mn-lt"/>
+                <a:ea typeface="+mn-ea"/>
+                <a:cs typeface="+mn-cs"/>
+              </a:defRPr>
+            </a:lvl8pPr>
+            <a:lvl9pPr marL="3886200" indent="-228600" algn="l" defTabSz="914400" rtl="0" eaLnBrk="1" latinLnBrk="0" hangingPunct="1">
+              <a:lnSpc>
+                <a:spcPct val="90000"/>
+              </a:lnSpc>
+              <a:spcBef>
+                <a:spcPts val="500"/>
+              </a:spcBef>
+              <a:buFont typeface="Arial" panose="020B0604020202020204" pitchFamily="34" charset="0"/>
+              <a:buChar char="•"/>
+              <a:defRPr sz="1800" kern="1200">
+                <a:solidFill>
+                  <a:schemeClr val="tx1"/>
+                </a:solidFill>
+                <a:latin typeface="+mn-lt"/>
+                <a:ea typeface="+mn-ea"/>
+                <a:cs typeface="+mn-cs"/>
+              </a:defRPr>
+            </a:lvl9pPr>
+          </a:lstStyle>
+          <a:p>
+            <a:pPr marL="0" indent="0">
+              <a:buFont typeface="Arial" panose="020B0604020202020204" pitchFamily="34" charset="0"/>
+              <a:buNone/>
+            </a:pPr>
+            <a:r>
+              <a:rPr lang="en-US" sz="2000" dirty="0"/>
+              <a:t>	A co-worker of Carlos quit the job. He realized it would be cool if he had a work colleague from LEIC, the same course he is. </a:t>
+            </a:r>
+          </a:p>
+          <a:p>
+            <a:pPr marL="0" indent="0">
+              <a:buFont typeface="Arial" panose="020B0604020202020204" pitchFamily="34" charset="0"/>
+              <a:buNone/>
+            </a:pPr>
+            <a:r>
+              <a:rPr lang="en-US" sz="2000" dirty="0"/>
+              <a:t>	Therefore, he registered in </a:t>
+            </a:r>
+            <a:r>
+              <a:rPr lang="en-US" sz="2000" dirty="0" err="1"/>
+              <a:t>LEICedin</a:t>
+            </a:r>
+            <a:r>
+              <a:rPr lang="en-US" sz="2000" dirty="0"/>
+              <a:t> and created a new job offer. Since he himself works in the same position (security) as the offer, he was able to provide reliable feedback on what his job is like in the description. </a:t>
+            </a:r>
+          </a:p>
+          <a:p>
+            <a:pPr marL="0" indent="0">
+              <a:buFont typeface="Arial" panose="020B0604020202020204" pitchFamily="34" charset="0"/>
+              <a:buNone/>
+            </a:pPr>
+            <a:r>
+              <a:rPr lang="en-US" sz="2000" dirty="0"/>
+              <a:t>	Any person interested would contact him and clarify any remaining doubts. In a final stage, Carlos would redirect them to his boss.</a:t>
+            </a:r>
+          </a:p>
+        </p:txBody>
+      </p:sp>
+    </p:spTree>
+    <p:extLst>
+      <p:ext uri="{BB962C8B-B14F-4D97-AF65-F5344CB8AC3E}">
+        <p14:creationId xmlns:p14="http://schemas.microsoft.com/office/powerpoint/2010/main" val="777683417"/>
+      </p:ext>
+    </p:extLst>
+  </p:cSld>
+  <p:clrMapOvr>
+    <a:masterClrMapping/>
+  </p:clrMapOvr>
+</p:sld>
+</file>
+
+<file path=ppt/slides/slide7.xml><?xml version="1.0" encoding="utf-8"?>
+<p:sld xmlns:a="http://schemas.openxmlformats.org/drawingml/2006/main" xmlns:r="http://schemas.openxmlformats.org/officeDocument/2006/relationships" xmlns:p="http://schemas.openxmlformats.org/presentationml/2006/main">
+  <p:cSld>
+    <p:spTree>
+      <p:nvGrpSpPr>
+        <p:cNvPr id="1" name=""/>
+        <p:cNvGrpSpPr/>
+        <p:nvPr/>
+      </p:nvGrpSpPr>
+      <p:grpSpPr>
+        <a:xfrm>
+          <a:off x="0" y="0"/>
+          <a:ext cx="0" cy="0"/>
+          <a:chOff x="0" y="0"/>
+          <a:chExt cx="0" cy="0"/>
+        </a:xfrm>
+      </p:grpSpPr>
+      <p:pic>
+        <p:nvPicPr>
+          <p:cNvPr id="5" name="Picture 4" descr="A picture containing text, clipart&#10;&#10;Description automatically generated">
+            <a:extLst>
+              <a:ext uri="{FF2B5EF4-FFF2-40B4-BE49-F238E27FC236}">
+                <a16:creationId xmlns:a16="http://schemas.microsoft.com/office/drawing/2014/main" id="{AEEF4F80-6182-437F-8FB9-E546318E1786}"/>
+              </a:ext>
+            </a:extLst>
+          </p:cNvPr>
+          <p:cNvPicPr>
+            <a:picLocks noChangeAspect="1"/>
+          </p:cNvPicPr>
+          <p:nvPr/>
+        </p:nvPicPr>
+        <p:blipFill>
+          <a:blip r:embed="rId3">
+            <a:extLst>
+              <a:ext uri="{28A0092B-C50C-407E-A947-70E740481C1C}">
+                <a14:useLocalDpi xmlns:a14="http://schemas.microsoft.com/office/drawing/2010/main" val="0"/>
+              </a:ext>
+            </a:extLst>
+          </a:blip>
+          <a:stretch>
+            <a:fillRect/>
+          </a:stretch>
+        </p:blipFill>
+        <p:spPr>
+          <a:xfrm>
+            <a:off x="8248817" y="327168"/>
+            <a:ext cx="3640043" cy="1401476"/>
+          </a:xfrm>
+          <a:prstGeom prst="rect">
+            <a:avLst/>
+          </a:prstGeom>
+        </p:spPr>
+      </p:pic>
+      <p:sp>
+        <p:nvSpPr>
+          <p:cNvPr id="6" name="Title 1">
+            <a:extLst>
+              <a:ext uri="{FF2B5EF4-FFF2-40B4-BE49-F238E27FC236}">
+                <a16:creationId xmlns:a16="http://schemas.microsoft.com/office/drawing/2014/main" id="{67EAB101-CB65-4E80-9086-38AF17265C5D}"/>
+              </a:ext>
+            </a:extLst>
+          </p:cNvPr>
+          <p:cNvSpPr txBox="1">
+            <a:spLocks/>
+          </p:cNvSpPr>
+          <p:nvPr/>
+        </p:nvSpPr>
+        <p:spPr>
+          <a:xfrm>
+            <a:off x="704851" y="549440"/>
+            <a:ext cx="7219949" cy="914399"/>
+          </a:xfrm>
+          <a:prstGeom prst="rect">
+            <a:avLst/>
+          </a:prstGeom>
+        </p:spPr>
+        <p:txBody>
+          <a:bodyPr vert="horz" lIns="91440" tIns="45720" rIns="91440" bIns="45720" rtlCol="0" anchor="ctr">
+            <a:normAutofit/>
+          </a:bodyPr>
+          <a:lstStyle>
+            <a:lvl1pPr algn="l" defTabSz="914400" rtl="0" eaLnBrk="1" latinLnBrk="0" hangingPunct="1">
+              <a:lnSpc>
+                <a:spcPct val="90000"/>
+              </a:lnSpc>
+              <a:spcBef>
+                <a:spcPct val="0"/>
+              </a:spcBef>
+              <a:buNone/>
+              <a:defRPr sz="4400" kern="1200">
+                <a:solidFill>
+                  <a:schemeClr val="tx1"/>
+                </a:solidFill>
+                <a:latin typeface="+mj-lt"/>
+                <a:ea typeface="+mj-ea"/>
+                <a:cs typeface="+mj-cs"/>
+              </a:defRPr>
+            </a:lvl1pPr>
+          </a:lstStyle>
+          <a:p>
+            <a:r>
+              <a:rPr lang="en-US" b="1" dirty="0"/>
+              <a:t>Functionalities and Tasks</a:t>
+            </a:r>
+          </a:p>
+        </p:txBody>
+      </p:sp>
+      <p:sp>
+        <p:nvSpPr>
+          <p:cNvPr id="11" name="Content Placeholder 2">
+            <a:extLst>
+              <a:ext uri="{FF2B5EF4-FFF2-40B4-BE49-F238E27FC236}">
+                <a16:creationId xmlns:a16="http://schemas.microsoft.com/office/drawing/2014/main" id="{6AB2115D-5135-CEAE-2998-AD5A7339ADDB}"/>
+              </a:ext>
+            </a:extLst>
+          </p:cNvPr>
+          <p:cNvSpPr txBox="1">
+            <a:spLocks/>
+          </p:cNvSpPr>
+          <p:nvPr/>
+        </p:nvSpPr>
+        <p:spPr>
+          <a:xfrm>
+            <a:off x="947887" y="2699656"/>
+            <a:ext cx="5334830" cy="3744089"/>
+          </a:xfrm>
+          <a:prstGeom prst="rect">
+            <a:avLst/>
+          </a:prstGeom>
+        </p:spPr>
+        <p:txBody>
+          <a:bodyPr vert="horz" lIns="91440" tIns="45720" rIns="91440" bIns="45720" rtlCol="0">
+            <a:normAutofit/>
+          </a:bodyPr>
+          <a:lstStyle>
+            <a:lvl1pPr marL="228600" indent="-228600" algn="l" defTabSz="914400" rtl="0" eaLnBrk="1" latinLnBrk="0" hangingPunct="1">
+              <a:lnSpc>
+                <a:spcPct val="90000"/>
+              </a:lnSpc>
+              <a:spcBef>
+                <a:spcPts val="1000"/>
+              </a:spcBef>
+              <a:buFont typeface="Arial" panose="020B0604020202020204" pitchFamily="34" charset="0"/>
+              <a:buChar char="•"/>
+              <a:defRPr sz="2800" kern="1200">
+                <a:solidFill>
+                  <a:schemeClr val="tx1"/>
+                </a:solidFill>
+                <a:latin typeface="+mn-lt"/>
+                <a:ea typeface="+mn-ea"/>
+                <a:cs typeface="+mn-cs"/>
+              </a:defRPr>
+            </a:lvl1pPr>
+            <a:lvl2pPr marL="685800" indent="-228600" algn="l" defTabSz="914400" rtl="0" eaLnBrk="1" latinLnBrk="0" hangingPunct="1">
+              <a:lnSpc>
+                <a:spcPct val="90000"/>
+              </a:lnSpc>
+              <a:spcBef>
+                <a:spcPts val="500"/>
+              </a:spcBef>
+              <a:buFont typeface="Arial" panose="020B0604020202020204" pitchFamily="34" charset="0"/>
+              <a:buChar char="•"/>
+              <a:defRPr sz="2400" kern="1200">
+                <a:solidFill>
+                  <a:schemeClr val="tx1"/>
+                </a:solidFill>
+                <a:latin typeface="+mn-lt"/>
+                <a:ea typeface="+mn-ea"/>
+                <a:cs typeface="+mn-cs"/>
+              </a:defRPr>
+            </a:lvl2pPr>
+            <a:lvl3pPr marL="1143000" indent="-228600" algn="l" defTabSz="914400" rtl="0" eaLnBrk="1" latinLnBrk="0" hangingPunct="1">
+              <a:lnSpc>
+                <a:spcPct val="90000"/>
+              </a:lnSpc>
+              <a:spcBef>
+                <a:spcPts val="500"/>
+              </a:spcBef>
+              <a:buFont typeface="Arial" panose="020B0604020202020204" pitchFamily="34" charset="0"/>
+              <a:buChar char="•"/>
+              <a:defRPr sz="2000" kern="1200">
+                <a:solidFill>
+                  <a:schemeClr val="tx1"/>
+                </a:solidFill>
+                <a:latin typeface="+mn-lt"/>
+                <a:ea typeface="+mn-ea"/>
+                <a:cs typeface="+mn-cs"/>
+              </a:defRPr>
+            </a:lvl3pPr>
+            <a:lvl4pPr marL="1600200" indent="-228600" algn="l" defTabSz="914400" rtl="0" eaLnBrk="1" latinLnBrk="0" hangingPunct="1">
+              <a:lnSpc>
+                <a:spcPct val="90000"/>
+              </a:lnSpc>
+              <a:spcBef>
+                <a:spcPts val="500"/>
+              </a:spcBef>
+              <a:buFont typeface="Arial" panose="020B0604020202020204" pitchFamily="34" charset="0"/>
+              <a:buChar char="•"/>
+              <a:defRPr sz="1800" kern="1200">
+                <a:solidFill>
+                  <a:schemeClr val="tx1"/>
+                </a:solidFill>
+                <a:latin typeface="+mn-lt"/>
+                <a:ea typeface="+mn-ea"/>
+                <a:cs typeface="+mn-cs"/>
+              </a:defRPr>
+            </a:lvl4pPr>
+            <a:lvl5pPr marL="2057400" indent="-228600" algn="l" defTabSz="914400" rtl="0" eaLnBrk="1" latinLnBrk="0" hangingPunct="1">
+              <a:lnSpc>
+                <a:spcPct val="90000"/>
+              </a:lnSpc>
+              <a:spcBef>
+                <a:spcPts val="500"/>
+              </a:spcBef>
+              <a:buFont typeface="Arial" panose="020B0604020202020204" pitchFamily="34" charset="0"/>
+              <a:buChar char="•"/>
+              <a:defRPr sz="1800" kern="1200">
+                <a:solidFill>
+                  <a:schemeClr val="tx1"/>
+                </a:solidFill>
+                <a:latin typeface="+mn-lt"/>
+                <a:ea typeface="+mn-ea"/>
+                <a:cs typeface="+mn-cs"/>
+              </a:defRPr>
+            </a:lvl5pPr>
+            <a:lvl6pPr marL="2514600" indent="-228600" algn="l" defTabSz="914400" rtl="0" eaLnBrk="1" latinLnBrk="0" hangingPunct="1">
+              <a:lnSpc>
+                <a:spcPct val="90000"/>
+              </a:lnSpc>
+              <a:spcBef>
+                <a:spcPts val="500"/>
+              </a:spcBef>
+              <a:buFont typeface="Arial" panose="020B0604020202020204" pitchFamily="34" charset="0"/>
+              <a:buChar char="•"/>
+              <a:defRPr sz="1800" kern="1200">
+                <a:solidFill>
+                  <a:schemeClr val="tx1"/>
+                </a:solidFill>
+                <a:latin typeface="+mn-lt"/>
+                <a:ea typeface="+mn-ea"/>
+                <a:cs typeface="+mn-cs"/>
+              </a:defRPr>
+            </a:lvl6pPr>
+            <a:lvl7pPr marL="2971800" indent="-228600" algn="l" defTabSz="914400" rtl="0" eaLnBrk="1" latinLnBrk="0" hangingPunct="1">
+              <a:lnSpc>
+                <a:spcPct val="90000"/>
+              </a:lnSpc>
+              <a:spcBef>
+                <a:spcPts val="500"/>
+              </a:spcBef>
+              <a:buFont typeface="Arial" panose="020B0604020202020204" pitchFamily="34" charset="0"/>
+              <a:buChar char="•"/>
+              <a:defRPr sz="1800" kern="1200">
+                <a:solidFill>
+                  <a:schemeClr val="tx1"/>
+                </a:solidFill>
+                <a:latin typeface="+mn-lt"/>
+                <a:ea typeface="+mn-ea"/>
+                <a:cs typeface="+mn-cs"/>
+              </a:defRPr>
+            </a:lvl7pPr>
+            <a:lvl8pPr marL="3429000" indent="-228600" algn="l" defTabSz="914400" rtl="0" eaLnBrk="1" latinLnBrk="0" hangingPunct="1">
+              <a:lnSpc>
+                <a:spcPct val="90000"/>
+              </a:lnSpc>
+              <a:spcBef>
+                <a:spcPts val="500"/>
+              </a:spcBef>
+              <a:buFont typeface="Arial" panose="020B0604020202020204" pitchFamily="34" charset="0"/>
+              <a:buChar char="•"/>
+              <a:defRPr sz="1800" kern="1200">
+                <a:solidFill>
+                  <a:schemeClr val="tx1"/>
+                </a:solidFill>
+                <a:latin typeface="+mn-lt"/>
+                <a:ea typeface="+mn-ea"/>
+                <a:cs typeface="+mn-cs"/>
+              </a:defRPr>
+            </a:lvl8pPr>
+            <a:lvl9pPr marL="3886200" indent="-228600" algn="l" defTabSz="914400" rtl="0" eaLnBrk="1" latinLnBrk="0" hangingPunct="1">
+              <a:lnSpc>
+                <a:spcPct val="90000"/>
+              </a:lnSpc>
+              <a:spcBef>
+                <a:spcPts val="500"/>
+              </a:spcBef>
+              <a:buFont typeface="Arial" panose="020B0604020202020204" pitchFamily="34" charset="0"/>
+              <a:buChar char="•"/>
+              <a:defRPr sz="1800" kern="1200">
+                <a:solidFill>
+                  <a:schemeClr val="tx1"/>
+                </a:solidFill>
+                <a:latin typeface="+mn-lt"/>
+                <a:ea typeface="+mn-ea"/>
+                <a:cs typeface="+mn-cs"/>
+              </a:defRPr>
+            </a:lvl9pPr>
+          </a:lstStyle>
+          <a:p>
+            <a:pPr marL="0" indent="0" algn="ctr">
+              <a:buFont typeface="Arial" panose="020B0604020202020204" pitchFamily="34" charset="0"/>
+              <a:buNone/>
+            </a:pPr>
+            <a:r>
+              <a:rPr lang="en-US" sz="2000" b="1" dirty="0">
+                <a:solidFill>
+                  <a:srgbClr val="993300"/>
+                </a:solidFill>
+              </a:rPr>
+              <a:t>Example of Functionalities:</a:t>
+            </a:r>
+          </a:p>
+          <a:p>
+            <a:pPr marL="0" indent="0" algn="ctr">
+              <a:buFont typeface="Arial" panose="020B0604020202020204" pitchFamily="34" charset="0"/>
+              <a:buNone/>
+            </a:pPr>
+            <a:endParaRPr lang="en-US" sz="2000" b="1" dirty="0">
+              <a:solidFill>
+                <a:srgbClr val="993300"/>
+              </a:solidFill>
+            </a:endParaRPr>
+          </a:p>
+          <a:p>
+            <a:pPr marL="0" indent="0" algn="ctr">
+              <a:buFont typeface="Arial" panose="020B0604020202020204" pitchFamily="34" charset="0"/>
+              <a:buNone/>
+            </a:pPr>
+            <a:r>
+              <a:rPr lang="en-US" sz="2000" dirty="0"/>
+              <a:t>Search an offer by name/location</a:t>
+            </a:r>
+          </a:p>
+          <a:p>
+            <a:pPr marL="0" indent="0" algn="ctr">
+              <a:buFont typeface="Arial" panose="020B0604020202020204" pitchFamily="34" charset="0"/>
+              <a:buNone/>
+            </a:pPr>
+            <a:r>
+              <a:rPr lang="en-US" sz="2000" dirty="0"/>
+              <a:t>Order the offers list</a:t>
+            </a:r>
+          </a:p>
+          <a:p>
+            <a:pPr marL="0" indent="0" algn="ctr">
+              <a:buFont typeface="Arial" panose="020B0604020202020204" pitchFamily="34" charset="0"/>
+              <a:buNone/>
+            </a:pPr>
+            <a:r>
+              <a:rPr lang="en-US" sz="2000" dirty="0"/>
+              <a:t>Contact the seller</a:t>
+            </a:r>
+          </a:p>
+        </p:txBody>
+      </p:sp>
+      <p:sp>
+        <p:nvSpPr>
+          <p:cNvPr id="2" name="Content Placeholder 2">
+            <a:extLst>
+              <a:ext uri="{FF2B5EF4-FFF2-40B4-BE49-F238E27FC236}">
+                <a16:creationId xmlns:a16="http://schemas.microsoft.com/office/drawing/2014/main" id="{B2096CE0-DEBA-F665-BBE1-AF9BFFFB16E8}"/>
+              </a:ext>
+            </a:extLst>
+          </p:cNvPr>
+          <p:cNvSpPr txBox="1">
+            <a:spLocks/>
+          </p:cNvSpPr>
+          <p:nvPr/>
+        </p:nvSpPr>
+        <p:spPr>
+          <a:xfrm>
+            <a:off x="6554030" y="2699657"/>
+            <a:ext cx="5334830" cy="3744089"/>
+          </a:xfrm>
+          <a:prstGeom prst="rect">
+            <a:avLst/>
+          </a:prstGeom>
+        </p:spPr>
+        <p:txBody>
+          <a:bodyPr vert="horz" lIns="91440" tIns="45720" rIns="91440" bIns="45720" rtlCol="0">
+            <a:normAutofit/>
+          </a:bodyPr>
+          <a:lstStyle>
+            <a:lvl1pPr marL="228600" indent="-228600" algn="l" defTabSz="914400" rtl="0" eaLnBrk="1" latinLnBrk="0" hangingPunct="1">
+              <a:lnSpc>
+                <a:spcPct val="90000"/>
+              </a:lnSpc>
+              <a:spcBef>
+                <a:spcPts val="1000"/>
+              </a:spcBef>
+              <a:buFont typeface="Arial" panose="020B0604020202020204" pitchFamily="34" charset="0"/>
+              <a:buChar char="•"/>
+              <a:defRPr sz="2800" kern="1200">
+                <a:solidFill>
+                  <a:schemeClr val="tx1"/>
+                </a:solidFill>
+                <a:latin typeface="+mn-lt"/>
+                <a:ea typeface="+mn-ea"/>
+                <a:cs typeface="+mn-cs"/>
+              </a:defRPr>
+            </a:lvl1pPr>
+            <a:lvl2pPr marL="685800" indent="-228600" algn="l" defTabSz="914400" rtl="0" eaLnBrk="1" latinLnBrk="0" hangingPunct="1">
+              <a:lnSpc>
+                <a:spcPct val="90000"/>
+              </a:lnSpc>
+              <a:spcBef>
+                <a:spcPts val="500"/>
+              </a:spcBef>
+              <a:buFont typeface="Arial" panose="020B0604020202020204" pitchFamily="34" charset="0"/>
+              <a:buChar char="•"/>
+              <a:defRPr sz="2400" kern="1200">
+                <a:solidFill>
+                  <a:schemeClr val="tx1"/>
+                </a:solidFill>
+                <a:latin typeface="+mn-lt"/>
+                <a:ea typeface="+mn-ea"/>
+                <a:cs typeface="+mn-cs"/>
+              </a:defRPr>
+            </a:lvl2pPr>
+            <a:lvl3pPr marL="1143000" indent="-228600" algn="l" defTabSz="914400" rtl="0" eaLnBrk="1" latinLnBrk="0" hangingPunct="1">
+              <a:lnSpc>
+                <a:spcPct val="90000"/>
+              </a:lnSpc>
+              <a:spcBef>
+                <a:spcPts val="500"/>
+              </a:spcBef>
+              <a:buFont typeface="Arial" panose="020B0604020202020204" pitchFamily="34" charset="0"/>
+              <a:buChar char="•"/>
+              <a:defRPr sz="2000" kern="1200">
+                <a:solidFill>
+                  <a:schemeClr val="tx1"/>
+                </a:solidFill>
+                <a:latin typeface="+mn-lt"/>
+                <a:ea typeface="+mn-ea"/>
+                <a:cs typeface="+mn-cs"/>
+              </a:defRPr>
+            </a:lvl3pPr>
+            <a:lvl4pPr marL="1600200" indent="-228600" algn="l" defTabSz="914400" rtl="0" eaLnBrk="1" latinLnBrk="0" hangingPunct="1">
+              <a:lnSpc>
+                <a:spcPct val="90000"/>
+              </a:lnSpc>
+              <a:spcBef>
+                <a:spcPts val="500"/>
+              </a:spcBef>
+              <a:buFont typeface="Arial" panose="020B0604020202020204" pitchFamily="34" charset="0"/>
+              <a:buChar char="•"/>
+              <a:defRPr sz="1800" kern="1200">
+                <a:solidFill>
+                  <a:schemeClr val="tx1"/>
+                </a:solidFill>
+                <a:latin typeface="+mn-lt"/>
+                <a:ea typeface="+mn-ea"/>
+                <a:cs typeface="+mn-cs"/>
+              </a:defRPr>
+            </a:lvl4pPr>
+            <a:lvl5pPr marL="2057400" indent="-228600" algn="l" defTabSz="914400" rtl="0" eaLnBrk="1" latinLnBrk="0" hangingPunct="1">
+              <a:lnSpc>
+                <a:spcPct val="90000"/>
+              </a:lnSpc>
+              <a:spcBef>
+                <a:spcPts val="500"/>
+              </a:spcBef>
+              <a:buFont typeface="Arial" panose="020B0604020202020204" pitchFamily="34" charset="0"/>
+              <a:buChar char="•"/>
+              <a:defRPr sz="1800" kern="1200">
+                <a:solidFill>
+                  <a:schemeClr val="tx1"/>
+                </a:solidFill>
+                <a:latin typeface="+mn-lt"/>
+                <a:ea typeface="+mn-ea"/>
+                <a:cs typeface="+mn-cs"/>
+              </a:defRPr>
+            </a:lvl5pPr>
+            <a:lvl6pPr marL="2514600" indent="-228600" algn="l" defTabSz="914400" rtl="0" eaLnBrk="1" latinLnBrk="0" hangingPunct="1">
+              <a:lnSpc>
+                <a:spcPct val="90000"/>
+              </a:lnSpc>
+              <a:spcBef>
+                <a:spcPts val="500"/>
+              </a:spcBef>
+              <a:buFont typeface="Arial" panose="020B0604020202020204" pitchFamily="34" charset="0"/>
+              <a:buChar char="•"/>
+              <a:defRPr sz="1800" kern="1200">
+                <a:solidFill>
+                  <a:schemeClr val="tx1"/>
+                </a:solidFill>
+                <a:latin typeface="+mn-lt"/>
+                <a:ea typeface="+mn-ea"/>
+                <a:cs typeface="+mn-cs"/>
+              </a:defRPr>
+            </a:lvl6pPr>
+            <a:lvl7pPr marL="2971800" indent="-228600" algn="l" defTabSz="914400" rtl="0" eaLnBrk="1" latinLnBrk="0" hangingPunct="1">
+              <a:lnSpc>
+                <a:spcPct val="90000"/>
+              </a:lnSpc>
+              <a:spcBef>
+                <a:spcPts val="500"/>
+              </a:spcBef>
+              <a:buFont typeface="Arial" panose="020B0604020202020204" pitchFamily="34" charset="0"/>
+              <a:buChar char="•"/>
+              <a:defRPr sz="1800" kern="1200">
+                <a:solidFill>
+                  <a:schemeClr val="tx1"/>
+                </a:solidFill>
+                <a:latin typeface="+mn-lt"/>
+                <a:ea typeface="+mn-ea"/>
+                <a:cs typeface="+mn-cs"/>
+              </a:defRPr>
+            </a:lvl7pPr>
+            <a:lvl8pPr marL="3429000" indent="-228600" algn="l" defTabSz="914400" rtl="0" eaLnBrk="1" latinLnBrk="0" hangingPunct="1">
+              <a:lnSpc>
+                <a:spcPct val="90000"/>
+              </a:lnSpc>
+              <a:spcBef>
+                <a:spcPts val="500"/>
+              </a:spcBef>
+              <a:buFont typeface="Arial" panose="020B0604020202020204" pitchFamily="34" charset="0"/>
+              <a:buChar char="•"/>
+              <a:defRPr sz="1800" kern="1200">
+                <a:solidFill>
+                  <a:schemeClr val="tx1"/>
+                </a:solidFill>
+                <a:latin typeface="+mn-lt"/>
+                <a:ea typeface="+mn-ea"/>
+                <a:cs typeface="+mn-cs"/>
+              </a:defRPr>
+            </a:lvl8pPr>
+            <a:lvl9pPr marL="3886200" indent="-228600" algn="l" defTabSz="914400" rtl="0" eaLnBrk="1" latinLnBrk="0" hangingPunct="1">
+              <a:lnSpc>
+                <a:spcPct val="90000"/>
+              </a:lnSpc>
+              <a:spcBef>
+                <a:spcPts val="500"/>
+              </a:spcBef>
+              <a:buFont typeface="Arial" panose="020B0604020202020204" pitchFamily="34" charset="0"/>
+              <a:buChar char="•"/>
+              <a:defRPr sz="1800" kern="1200">
+                <a:solidFill>
+                  <a:schemeClr val="tx1"/>
+                </a:solidFill>
+                <a:latin typeface="+mn-lt"/>
+                <a:ea typeface="+mn-ea"/>
+                <a:cs typeface="+mn-cs"/>
+              </a:defRPr>
+            </a:lvl9pPr>
+          </a:lstStyle>
+          <a:p>
+            <a:pPr marL="0" indent="0" algn="ctr">
+              <a:buFont typeface="Arial" panose="020B0604020202020204" pitchFamily="34" charset="0"/>
+              <a:buNone/>
+            </a:pPr>
+            <a:r>
+              <a:rPr lang="en-US" sz="2000" b="1" dirty="0">
+                <a:solidFill>
+                  <a:srgbClr val="993300"/>
+                </a:solidFill>
+              </a:rPr>
+              <a:t>Example of Tasks:</a:t>
+            </a:r>
+          </a:p>
+          <a:p>
+            <a:pPr marL="0" indent="0" algn="ctr">
+              <a:buFont typeface="Arial" panose="020B0604020202020204" pitchFamily="34" charset="0"/>
+              <a:buNone/>
+            </a:pPr>
+            <a:endParaRPr lang="en-US" sz="1900" dirty="0"/>
+          </a:p>
+          <a:p>
+            <a:pPr marL="0" indent="0" algn="ctr">
+              <a:buNone/>
+            </a:pPr>
+            <a:r>
+              <a:rPr lang="en-US" sz="2000" dirty="0"/>
+              <a:t>Search offers in a certain street</a:t>
+            </a:r>
+          </a:p>
+          <a:p>
+            <a:pPr marL="0" indent="0" algn="ctr">
+              <a:buNone/>
+            </a:pPr>
+            <a:r>
+              <a:rPr lang="en-US" sz="2000" dirty="0"/>
+              <a:t>Order the offers by price</a:t>
+            </a:r>
+          </a:p>
+          <a:p>
+            <a:pPr marL="0" indent="0" algn="ctr">
+              <a:buNone/>
+            </a:pPr>
+            <a:r>
+              <a:rPr lang="en-US" sz="2000" dirty="0"/>
+              <a:t>Send CV to seller</a:t>
+            </a:r>
+          </a:p>
+          <a:p>
+            <a:pPr marL="0" indent="0" algn="ctr">
+              <a:buFont typeface="Arial" panose="020B0604020202020204" pitchFamily="34" charset="0"/>
+              <a:buNone/>
+            </a:pPr>
+            <a:endParaRPr lang="en-US" sz="2000" dirty="0">
+              <a:solidFill>
+                <a:srgbClr val="993300"/>
+              </a:solidFill>
+            </a:endParaRPr>
+          </a:p>
+        </p:txBody>
+      </p:sp>
+      <p:cxnSp>
+        <p:nvCxnSpPr>
+          <p:cNvPr id="3" name="Straight Arrow Connector 2">
+            <a:extLst>
+              <a:ext uri="{FF2B5EF4-FFF2-40B4-BE49-F238E27FC236}">
+                <a16:creationId xmlns:a16="http://schemas.microsoft.com/office/drawing/2014/main" id="{92B52C55-9B56-3C29-C41F-1591909785C0}"/>
+              </a:ext>
+            </a:extLst>
+          </p:cNvPr>
+          <p:cNvCxnSpPr>
+            <a:cxnSpLocks/>
+          </p:cNvCxnSpPr>
+          <p:nvPr/>
+        </p:nvCxnSpPr>
+        <p:spPr>
+          <a:xfrm>
+            <a:off x="5758543" y="4049486"/>
+            <a:ext cx="1284514" cy="0"/>
+          </a:xfrm>
+          <a:prstGeom prst="straightConnector1">
+            <a:avLst/>
+          </a:prstGeom>
+          <a:ln w="38100">
+            <a:solidFill>
+              <a:srgbClr val="993300"/>
+            </a:solidFill>
+            <a:tailEnd type="triangle"/>
+          </a:ln>
+        </p:spPr>
+        <p:style>
+          <a:lnRef idx="1">
+            <a:schemeClr val="accent1"/>
+          </a:lnRef>
+          <a:fillRef idx="0">
+            <a:schemeClr val="accent1"/>
+          </a:fillRef>
+          <a:effectRef idx="0">
+            <a:schemeClr val="accent1"/>
+          </a:effectRef>
+          <a:fontRef idx="minor">
+            <a:schemeClr val="tx1"/>
+          </a:fontRef>
+        </p:style>
+      </p:cxnSp>
+    </p:spTree>
+    <p:extLst>
+      <p:ext uri="{BB962C8B-B14F-4D97-AF65-F5344CB8AC3E}">
+        <p14:creationId xmlns:p14="http://schemas.microsoft.com/office/powerpoint/2010/main" val="1941788761"/>
+      </p:ext>
+    </p:extLst>
+  </p:cSld>
+  <p:clrMapOvr>
+    <a:masterClrMapping/>
+  </p:clrMapOvr>
+</p:sld>
+</file>
+
+<file path=ppt/slides/slide8.xml><?xml version="1.0" encoding="utf-8"?>
+<p:sld xmlns:a="http://schemas.openxmlformats.org/drawingml/2006/main" xmlns:r="http://schemas.openxmlformats.org/officeDocument/2006/relationships" xmlns:p="http://schemas.openxmlformats.org/presentationml/2006/main">
+  <p:cSld>
+    <p:spTree>
+      <p:nvGrpSpPr>
+        <p:cNvPr id="1" name=""/>
+        <p:cNvGrpSpPr/>
+        <p:nvPr/>
+      </p:nvGrpSpPr>
+      <p:grpSpPr>
+        <a:xfrm>
+          <a:off x="0" y="0"/>
+          <a:ext cx="0" cy="0"/>
+          <a:chOff x="0" y="0"/>
+          <a:chExt cx="0" cy="0"/>
+        </a:xfrm>
+      </p:grpSpPr>
+      <p:pic>
+        <p:nvPicPr>
+          <p:cNvPr id="5" name="Picture 4" descr="A picture containing text, clipart&#10;&#10;Description automatically generated">
+            <a:extLst>
+              <a:ext uri="{FF2B5EF4-FFF2-40B4-BE49-F238E27FC236}">
+                <a16:creationId xmlns:a16="http://schemas.microsoft.com/office/drawing/2014/main" id="{AEEF4F80-6182-437F-8FB9-E546318E1786}"/>
+              </a:ext>
+            </a:extLst>
+          </p:cNvPr>
+          <p:cNvPicPr>
+            <a:picLocks noChangeAspect="1"/>
+          </p:cNvPicPr>
+          <p:nvPr/>
+        </p:nvPicPr>
+        <p:blipFill>
+          <a:blip r:embed="rId3">
+            <a:extLst>
+              <a:ext uri="{28A0092B-C50C-407E-A947-70E740481C1C}">
+                <a14:useLocalDpi xmlns:a14="http://schemas.microsoft.com/office/drawing/2010/main" val="0"/>
+              </a:ext>
+            </a:extLst>
+          </a:blip>
+          <a:stretch>
+            <a:fillRect/>
+          </a:stretch>
+        </p:blipFill>
+        <p:spPr>
+          <a:xfrm>
+            <a:off x="8248817" y="327168"/>
+            <a:ext cx="3640043" cy="1401476"/>
+          </a:xfrm>
+          <a:prstGeom prst="rect">
+            <a:avLst/>
+          </a:prstGeom>
+        </p:spPr>
+      </p:pic>
+      <p:sp>
+        <p:nvSpPr>
+          <p:cNvPr id="6" name="Title 1">
+            <a:extLst>
+              <a:ext uri="{FF2B5EF4-FFF2-40B4-BE49-F238E27FC236}">
+                <a16:creationId xmlns:a16="http://schemas.microsoft.com/office/drawing/2014/main" id="{67EAB101-CB65-4E80-9086-38AF17265C5D}"/>
+              </a:ext>
+            </a:extLst>
+          </p:cNvPr>
+          <p:cNvSpPr txBox="1">
+            <a:spLocks/>
+          </p:cNvSpPr>
+          <p:nvPr/>
+        </p:nvSpPr>
+        <p:spPr>
+          <a:xfrm>
+            <a:off x="704851" y="549440"/>
+            <a:ext cx="7219949" cy="914399"/>
+          </a:xfrm>
+          <a:prstGeom prst="rect">
+            <a:avLst/>
+          </a:prstGeom>
+        </p:spPr>
+        <p:txBody>
+          <a:bodyPr vert="horz" lIns="91440" tIns="45720" rIns="91440" bIns="45720" rtlCol="0" anchor="ctr">
+            <a:normAutofit/>
+          </a:bodyPr>
+          <a:lstStyle>
+            <a:lvl1pPr algn="l" defTabSz="914400" rtl="0" eaLnBrk="1" latinLnBrk="0" hangingPunct="1">
+              <a:lnSpc>
+                <a:spcPct val="90000"/>
+              </a:lnSpc>
+              <a:spcBef>
+                <a:spcPct val="0"/>
+              </a:spcBef>
+              <a:buNone/>
+              <a:defRPr sz="4400" kern="1200">
+                <a:solidFill>
+                  <a:schemeClr val="tx1"/>
+                </a:solidFill>
+                <a:latin typeface="+mj-lt"/>
+                <a:ea typeface="+mj-ea"/>
+                <a:cs typeface="+mj-cs"/>
+              </a:defRPr>
+            </a:lvl1pPr>
+          </a:lstStyle>
+          <a:p>
+            <a:r>
+              <a:rPr lang="en-US" b="1" dirty="0"/>
+              <a:t>Usability Requirements</a:t>
+            </a:r>
+          </a:p>
+        </p:txBody>
+      </p:sp>
+      <p:sp>
+        <p:nvSpPr>
+          <p:cNvPr id="11" name="Content Placeholder 2">
+            <a:extLst>
+              <a:ext uri="{FF2B5EF4-FFF2-40B4-BE49-F238E27FC236}">
+                <a16:creationId xmlns:a16="http://schemas.microsoft.com/office/drawing/2014/main" id="{6AB2115D-5135-CEAE-2998-AD5A7339ADDB}"/>
+              </a:ext>
+            </a:extLst>
+          </p:cNvPr>
+          <p:cNvSpPr txBox="1">
+            <a:spLocks/>
+          </p:cNvSpPr>
+          <p:nvPr/>
+        </p:nvSpPr>
+        <p:spPr>
+          <a:xfrm>
+            <a:off x="761170" y="2079171"/>
+            <a:ext cx="10669660" cy="4451661"/>
+          </a:xfrm>
+          <a:prstGeom prst="rect">
+            <a:avLst/>
+          </a:prstGeom>
+        </p:spPr>
+        <p:txBody>
+          <a:bodyPr vert="horz" lIns="91440" tIns="45720" rIns="91440" bIns="45720" rtlCol="0">
+            <a:normAutofit/>
+          </a:bodyPr>
+          <a:lstStyle>
+            <a:lvl1pPr marL="228600" indent="-228600" algn="l" defTabSz="914400" rtl="0" eaLnBrk="1" latinLnBrk="0" hangingPunct="1">
+              <a:lnSpc>
+                <a:spcPct val="90000"/>
+              </a:lnSpc>
+              <a:spcBef>
+                <a:spcPts val="1000"/>
+              </a:spcBef>
+              <a:buFont typeface="Arial" panose="020B0604020202020204" pitchFamily="34" charset="0"/>
+              <a:buChar char="•"/>
+              <a:defRPr sz="2800" kern="1200">
+                <a:solidFill>
+                  <a:schemeClr val="tx1"/>
+                </a:solidFill>
+                <a:latin typeface="+mn-lt"/>
+                <a:ea typeface="+mn-ea"/>
+                <a:cs typeface="+mn-cs"/>
+              </a:defRPr>
+            </a:lvl1pPr>
+            <a:lvl2pPr marL="685800" indent="-228600" algn="l" defTabSz="914400" rtl="0" eaLnBrk="1" latinLnBrk="0" hangingPunct="1">
+              <a:lnSpc>
+                <a:spcPct val="90000"/>
+              </a:lnSpc>
+              <a:spcBef>
+                <a:spcPts val="500"/>
+              </a:spcBef>
+              <a:buFont typeface="Arial" panose="020B0604020202020204" pitchFamily="34" charset="0"/>
+              <a:buChar char="•"/>
+              <a:defRPr sz="2400" kern="1200">
+                <a:solidFill>
+                  <a:schemeClr val="tx1"/>
+                </a:solidFill>
+                <a:latin typeface="+mn-lt"/>
+                <a:ea typeface="+mn-ea"/>
+                <a:cs typeface="+mn-cs"/>
+              </a:defRPr>
+            </a:lvl2pPr>
+            <a:lvl3pPr marL="1143000" indent="-228600" algn="l" defTabSz="914400" rtl="0" eaLnBrk="1" latinLnBrk="0" hangingPunct="1">
+              <a:lnSpc>
+                <a:spcPct val="90000"/>
+              </a:lnSpc>
+              <a:spcBef>
+                <a:spcPts val="500"/>
+              </a:spcBef>
+              <a:buFont typeface="Arial" panose="020B0604020202020204" pitchFamily="34" charset="0"/>
+              <a:buChar char="•"/>
+              <a:defRPr sz="2000" kern="1200">
+                <a:solidFill>
+                  <a:schemeClr val="tx1"/>
+                </a:solidFill>
+                <a:latin typeface="+mn-lt"/>
+                <a:ea typeface="+mn-ea"/>
+                <a:cs typeface="+mn-cs"/>
+              </a:defRPr>
+            </a:lvl3pPr>
+            <a:lvl4pPr marL="1600200" indent="-228600" algn="l" defTabSz="914400" rtl="0" eaLnBrk="1" latinLnBrk="0" hangingPunct="1">
+              <a:lnSpc>
+                <a:spcPct val="90000"/>
+              </a:lnSpc>
+              <a:spcBef>
+                <a:spcPts val="500"/>
+              </a:spcBef>
+              <a:buFont typeface="Arial" panose="020B0604020202020204" pitchFamily="34" charset="0"/>
+              <a:buChar char="•"/>
+              <a:defRPr sz="1800" kern="1200">
+                <a:solidFill>
+                  <a:schemeClr val="tx1"/>
+                </a:solidFill>
+                <a:latin typeface="+mn-lt"/>
+                <a:ea typeface="+mn-ea"/>
+                <a:cs typeface="+mn-cs"/>
+              </a:defRPr>
+            </a:lvl4pPr>
+            <a:lvl5pPr marL="2057400" indent="-228600" algn="l" defTabSz="914400" rtl="0" eaLnBrk="1" latinLnBrk="0" hangingPunct="1">
+              <a:lnSpc>
+                <a:spcPct val="90000"/>
+              </a:lnSpc>
+              <a:spcBef>
+                <a:spcPts val="500"/>
+              </a:spcBef>
+              <a:buFont typeface="Arial" panose="020B0604020202020204" pitchFamily="34" charset="0"/>
+              <a:buChar char="•"/>
+              <a:defRPr sz="1800" kern="1200">
+                <a:solidFill>
+                  <a:schemeClr val="tx1"/>
+                </a:solidFill>
+                <a:latin typeface="+mn-lt"/>
+                <a:ea typeface="+mn-ea"/>
+                <a:cs typeface="+mn-cs"/>
+              </a:defRPr>
+            </a:lvl5pPr>
+            <a:lvl6pPr marL="2514600" indent="-228600" algn="l" defTabSz="914400" rtl="0" eaLnBrk="1" latinLnBrk="0" hangingPunct="1">
+              <a:lnSpc>
+                <a:spcPct val="90000"/>
+              </a:lnSpc>
+              <a:spcBef>
+                <a:spcPts val="500"/>
+              </a:spcBef>
+              <a:buFont typeface="Arial" panose="020B0604020202020204" pitchFamily="34" charset="0"/>
+              <a:buChar char="•"/>
+              <a:defRPr sz="1800" kern="1200">
+                <a:solidFill>
+                  <a:schemeClr val="tx1"/>
+                </a:solidFill>
+                <a:latin typeface="+mn-lt"/>
+                <a:ea typeface="+mn-ea"/>
+                <a:cs typeface="+mn-cs"/>
+              </a:defRPr>
+            </a:lvl6pPr>
+            <a:lvl7pPr marL="2971800" indent="-228600" algn="l" defTabSz="914400" rtl="0" eaLnBrk="1" latinLnBrk="0" hangingPunct="1">
+              <a:lnSpc>
+                <a:spcPct val="90000"/>
+              </a:lnSpc>
+              <a:spcBef>
+                <a:spcPts val="500"/>
+              </a:spcBef>
+              <a:buFont typeface="Arial" panose="020B0604020202020204" pitchFamily="34" charset="0"/>
+              <a:buChar char="•"/>
+              <a:defRPr sz="1800" kern="1200">
+                <a:solidFill>
+                  <a:schemeClr val="tx1"/>
+                </a:solidFill>
+                <a:latin typeface="+mn-lt"/>
+                <a:ea typeface="+mn-ea"/>
+                <a:cs typeface="+mn-cs"/>
+              </a:defRPr>
+            </a:lvl7pPr>
+            <a:lvl8pPr marL="3429000" indent="-228600" algn="l" defTabSz="914400" rtl="0" eaLnBrk="1" latinLnBrk="0" hangingPunct="1">
+              <a:lnSpc>
+                <a:spcPct val="90000"/>
+              </a:lnSpc>
+              <a:spcBef>
+                <a:spcPts val="500"/>
+              </a:spcBef>
+              <a:buFont typeface="Arial" panose="020B0604020202020204" pitchFamily="34" charset="0"/>
+              <a:buChar char="•"/>
+              <a:defRPr sz="1800" kern="1200">
+                <a:solidFill>
+                  <a:schemeClr val="tx1"/>
+                </a:solidFill>
+                <a:latin typeface="+mn-lt"/>
+                <a:ea typeface="+mn-ea"/>
+                <a:cs typeface="+mn-cs"/>
+              </a:defRPr>
+            </a:lvl8pPr>
+            <a:lvl9pPr marL="3886200" indent="-228600" algn="l" defTabSz="914400" rtl="0" eaLnBrk="1" latinLnBrk="0" hangingPunct="1">
+              <a:lnSpc>
+                <a:spcPct val="90000"/>
+              </a:lnSpc>
+              <a:spcBef>
+                <a:spcPts val="500"/>
+              </a:spcBef>
+              <a:buFont typeface="Arial" panose="020B0604020202020204" pitchFamily="34" charset="0"/>
+              <a:buChar char="•"/>
+              <a:defRPr sz="1800" kern="1200">
+                <a:solidFill>
+                  <a:schemeClr val="tx1"/>
+                </a:solidFill>
+                <a:latin typeface="+mn-lt"/>
+                <a:ea typeface="+mn-ea"/>
+                <a:cs typeface="+mn-cs"/>
+              </a:defRPr>
+            </a:lvl9pPr>
+          </a:lstStyle>
+          <a:p>
+            <a:r>
+              <a:rPr lang="en-US" sz="2000" b="1" dirty="0">
+                <a:solidFill>
+                  <a:srgbClr val="993300"/>
+                </a:solidFill>
+              </a:rPr>
+              <a:t>Efficacy </a:t>
+            </a:r>
+          </a:p>
+          <a:p>
+            <a:pPr marL="0" indent="0">
+              <a:buNone/>
+            </a:pPr>
+            <a:r>
+              <a:rPr lang="en-US" sz="2000" dirty="0"/>
+              <a:t>The use of the platform is carried out intuitively, with only 5% of users making a mistake.</a:t>
+            </a:r>
+          </a:p>
+          <a:p>
+            <a:pPr marL="0" indent="0">
+              <a:buNone/>
+            </a:pPr>
+            <a:r>
+              <a:rPr lang="en-US" sz="2000" dirty="0"/>
+              <a:t> </a:t>
+            </a:r>
+          </a:p>
+          <a:p>
+            <a:r>
+              <a:rPr lang="en-US" sz="2000" b="1" dirty="0">
+                <a:solidFill>
+                  <a:srgbClr val="993300"/>
+                </a:solidFill>
+              </a:rPr>
+              <a:t>Efficiency</a:t>
+            </a:r>
+            <a:r>
+              <a:rPr lang="en-US" sz="2000" dirty="0"/>
+              <a:t> </a:t>
+            </a:r>
+          </a:p>
+          <a:p>
+            <a:pPr marL="0" indent="0">
+              <a:buNone/>
+            </a:pPr>
+            <a:r>
+              <a:rPr lang="en-US" sz="2000" dirty="0"/>
+              <a:t>Users can find an interesting offer in less than 1 minute.</a:t>
+            </a:r>
+          </a:p>
+          <a:p>
+            <a:pPr marL="0" indent="0">
+              <a:buNone/>
+            </a:pPr>
+            <a:endParaRPr lang="en-US" sz="2000" dirty="0"/>
+          </a:p>
+          <a:p>
+            <a:r>
+              <a:rPr lang="en-US" sz="2000" b="1" dirty="0">
+                <a:solidFill>
+                  <a:srgbClr val="993300"/>
+                </a:solidFill>
+              </a:rPr>
+              <a:t>Satisfaction</a:t>
+            </a:r>
+            <a:r>
+              <a:rPr lang="en-US" sz="2000" dirty="0"/>
+              <a:t> </a:t>
+            </a:r>
+          </a:p>
+          <a:p>
+            <a:pPr marL="0" indent="0">
+              <a:buNone/>
+            </a:pPr>
+            <a:r>
+              <a:rPr lang="en-US" sz="2000" dirty="0"/>
+              <a:t>The platform must match the expectations of 95% of new users.</a:t>
+            </a:r>
+          </a:p>
+        </p:txBody>
+      </p:sp>
+    </p:spTree>
+    <p:extLst>
+      <p:ext uri="{BB962C8B-B14F-4D97-AF65-F5344CB8AC3E}">
+        <p14:creationId xmlns:p14="http://schemas.microsoft.com/office/powerpoint/2010/main" val="2720204355"/>
+      </p:ext>
+    </p:extLst>
+  </p:cSld>
+  <p:clrMapOvr>
+    <a:masterClrMapping/>
+  </p:clrMapOvr>
+</p:sld>
+</file>
+
+<file path=ppt/slides/slide9.xml><?xml version="1.0" encoding="utf-8"?>
 <p:sld xmlns:a="http://schemas.openxmlformats.org/drawingml/2006/main" xmlns:r="http://schemas.openxmlformats.org/officeDocument/2006/relationships" xmlns:p="http://schemas.openxmlformats.org/presentationml/2006/main">
   <p:cSld>
     <p:spTree>
@@ -12078,6 +13741,21 @@
 </file>
 
 <file path=customXml/item1.xml><?xml version="1.0" encoding="utf-8"?>
+<p:properties xmlns:p="http://schemas.microsoft.com/office/2006/metadata/properties" xmlns:xsi="http://www.w3.org/2001/XMLSchema-instance" xmlns:pc="http://schemas.microsoft.com/office/infopath/2007/PartnerControls">
+  <documentManagement/>
+</p:properties>
+</file>
+
+<file path=customXml/item2.xml><?xml version="1.0" encoding="utf-8"?>
+<?mso-contentType ?>
+<FormTemplates xmlns="http://schemas.microsoft.com/sharepoint/v3/contenttype/forms">
+  <Display>DocumentLibraryForm</Display>
+  <Edit>DocumentLibraryForm</Edit>
+  <New>DocumentLibraryForm</New>
+</FormTemplates>
+</file>
+
+<file path=customXml/item3.xml><?xml version="1.0" encoding="utf-8"?>
 <ct:contentTypeSchema xmlns:ct="http://schemas.microsoft.com/office/2006/metadata/contentType" xmlns:ma="http://schemas.microsoft.com/office/2006/metadata/properties/metaAttributes" ct:_="" ma:_="" ma:contentTypeName="Documento" ma:contentTypeID="0x01010014BC32AFF3718747B5A2CE47A88F3C6A" ma:contentTypeVersion="2" ma:contentTypeDescription="Criar um novo documento." ma:contentTypeScope="" ma:versionID="fee3d826901bcb9451dce0bbc19dadc3">
   <xsd:schema xmlns:xsd="http://www.w3.org/2001/XMLSchema" xmlns:xs="http://www.w3.org/2001/XMLSchema" xmlns:p="http://schemas.microsoft.com/office/2006/metadata/properties" xmlns:ns3="a47fcd35-67e3-4b66-9352-8d0db098ec50" targetNamespace="http://schemas.microsoft.com/office/2006/metadata/properties" ma:root="true" ma:fieldsID="deb6b73c7f47f6e6612a6af669b62c39" ns3:_="">
     <xsd:import namespace="a47fcd35-67e3-4b66-9352-8d0db098ec50"/>
@@ -12209,22 +13887,31 @@
 </ct:contentTypeSchema>
 </file>
 
-<file path=customXml/item2.xml><?xml version="1.0" encoding="utf-8"?>
-<?mso-contentType ?>
-<FormTemplates xmlns="http://schemas.microsoft.com/sharepoint/v3/contenttype/forms">
-  <Display>DocumentLibraryForm</Display>
-  <Edit>DocumentLibraryForm</Edit>
-  <New>DocumentLibraryForm</New>
-</FormTemplates>
+<file path=customXml/itemProps1.xml><?xml version="1.0" encoding="utf-8"?>
+<ds:datastoreItem xmlns:ds="http://schemas.openxmlformats.org/officeDocument/2006/customXml" ds:itemID="{05E380B0-3793-4519-A034-114F335A5299}">
+  <ds:schemaRefs>
+    <ds:schemaRef ds:uri="http://purl.org/dc/terms/"/>
+    <ds:schemaRef ds:uri="http://schemas.microsoft.com/office/2006/documentManagement/types"/>
+    <ds:schemaRef ds:uri="http://purl.org/dc/elements/1.1/"/>
+    <ds:schemaRef ds:uri="http://schemas.microsoft.com/office/2006/metadata/properties"/>
+    <ds:schemaRef ds:uri="http://purl.org/dc/dcmitype/"/>
+    <ds:schemaRef ds:uri="http://schemas.microsoft.com/office/infopath/2007/PartnerControls"/>
+    <ds:schemaRef ds:uri="http://schemas.openxmlformats.org/package/2006/metadata/core-properties"/>
+    <ds:schemaRef ds:uri="a47fcd35-67e3-4b66-9352-8d0db098ec50"/>
+    <ds:schemaRef ds:uri="http://www.w3.org/XML/1998/namespace"/>
+  </ds:schemaRefs>
+</ds:datastoreItem>
 </file>
 
-<file path=customXml/item3.xml><?xml version="1.0" encoding="utf-8"?>
-<p:properties xmlns:p="http://schemas.microsoft.com/office/2006/metadata/properties" xmlns:xsi="http://www.w3.org/2001/XMLSchema-instance" xmlns:pc="http://schemas.microsoft.com/office/infopath/2007/PartnerControls">
-  <documentManagement/>
-</p:properties>
+<file path=customXml/itemProps2.xml><?xml version="1.0" encoding="utf-8"?>
+<ds:datastoreItem xmlns:ds="http://schemas.openxmlformats.org/officeDocument/2006/customXml" ds:itemID="{76EE102A-C587-47D4-980D-6EF803504572}">
+  <ds:schemaRefs>
+    <ds:schemaRef ds:uri="http://schemas.microsoft.com/sharepoint/v3/contenttype/forms"/>
+  </ds:schemaRefs>
+</ds:datastoreItem>
 </file>
 
-<file path=customXml/itemProps1.xml><?xml version="1.0" encoding="utf-8"?>
+<file path=customXml/itemProps3.xml><?xml version="1.0" encoding="utf-8"?>
 <ds:datastoreItem xmlns:ds="http://schemas.openxmlformats.org/officeDocument/2006/customXml" ds:itemID="{9697E427-2E56-4B40-B661-233DAE44C32F}">
   <ds:schemaRefs>
     <ds:schemaRef ds:uri="http://schemas.microsoft.com/office/2006/metadata/contentType"/>
@@ -12240,28 +13927,4 @@
     <ds:schemaRef ds:uri="http://schemas.microsoft.com/internal/obd"/>
   </ds:schemaRefs>
 </ds:datastoreItem>
-</file>
-
-<file path=customXml/itemProps2.xml><?xml version="1.0" encoding="utf-8"?>
-<ds:datastoreItem xmlns:ds="http://schemas.openxmlformats.org/officeDocument/2006/customXml" ds:itemID="{76EE102A-C587-47D4-980D-6EF803504572}">
-  <ds:schemaRefs>
-    <ds:schemaRef ds:uri="http://schemas.microsoft.com/sharepoint/v3/contenttype/forms"/>
-  </ds:schemaRefs>
-</ds:datastoreItem>
-</file>
-
-<file path=customXml/itemProps3.xml><?xml version="1.0" encoding="utf-8"?>
-<ds:datastoreItem xmlns:ds="http://schemas.openxmlformats.org/officeDocument/2006/customXml" ds:itemID="{05E380B0-3793-4519-A034-114F335A5299}">
-  <ds:schemaRefs>
-    <ds:schemaRef ds:uri="http://purl.org/dc/terms/"/>
-    <ds:schemaRef ds:uri="http://schemas.microsoft.com/office/2006/documentManagement/types"/>
-    <ds:schemaRef ds:uri="http://purl.org/dc/elements/1.1/"/>
-    <ds:schemaRef ds:uri="http://schemas.microsoft.com/office/2006/metadata/properties"/>
-    <ds:schemaRef ds:uri="http://purl.org/dc/dcmitype/"/>
-    <ds:schemaRef ds:uri="http://schemas.microsoft.com/office/infopath/2007/PartnerControls"/>
-    <ds:schemaRef ds:uri="http://schemas.openxmlformats.org/package/2006/metadata/core-properties"/>
-    <ds:schemaRef ds:uri="a47fcd35-67e3-4b66-9352-8d0db098ec50"/>
-    <ds:schemaRef ds:uri="http://www.w3.org/XML/1998/namespace"/>
-  </ds:schemaRefs>
-</ds:datastoreItem>
 </file>
</xml_diff>